<commit_message>
pridane fotky z cvicenia
</commit_message>
<xml_diff>
--- a/Cvicenia/cvicenie2_25.9.2017/prezentacia1_interakcia.pptx
+++ b/Cvicenia/cvicenie2_25.9.2017/prezentacia1_interakcia.pptx
@@ -112,11 +112,48 @@
       </a:defRPr>
     </a:lvl9pPr>
   </p:defaultTextStyle>
+  <p:extLst>
+    <p:ext uri="{EFAFB233-063F-42B5-8137-9DF3F51BA10A}">
+      <p15:sldGuideLst xmlns:p15="http://schemas.microsoft.com/office/powerpoint/2012/main"/>
+    </p:ext>
+  </p:extLst>
 </p:presentation>
 </file>
 
-<file path=ppt/revisionInfo.xml><?xml version="1.0" encoding="utf-8"?>
-<p1510:revInfo xmlns:a="http://schemas.openxmlformats.org/drawingml/2006/main" xmlns:r="http://schemas.openxmlformats.org/officeDocument/2006/relationships" xmlns:p1510="http://schemas.microsoft.com/office/powerpoint/2015/10/main"/>
+<file path=ppt/changesInfos/changesInfo1.xml><?xml version="1.0" encoding="utf-8"?>
+<pc:chgInfo xmlns:a="http://schemas.openxmlformats.org/drawingml/2006/main" xmlns:r="http://schemas.openxmlformats.org/officeDocument/2006/relationships" xmlns:ac="http://schemas.microsoft.com/office/drawing/2013/main/command" xmlns:pc="http://schemas.microsoft.com/office/powerpoint/2013/main/command">
+  <pc:docChgLst>
+    <pc:chgData name="Adam Kňaze" userId="40677637-cd6a-4c91-9dcf-629dc9dfff03" providerId="ADAL" clId="{C8D4145A-32E1-4756-AF8D-DEC4E8549694}"/>
+    <pc:docChg chg="undo addSld delSld modSld">
+      <pc:chgData name="Adam Kňaze" userId="40677637-cd6a-4c91-9dcf-629dc9dfff03" providerId="ADAL" clId="{C8D4145A-32E1-4756-AF8D-DEC4E8549694}" dt="2017-09-28T11:32:40.135" v="4" actId="20577"/>
+      <pc:docMkLst>
+        <pc:docMk/>
+      </pc:docMkLst>
+      <pc:sldChg chg="modSp">
+        <pc:chgData name="Adam Kňaze" userId="40677637-cd6a-4c91-9dcf-629dc9dfff03" providerId="ADAL" clId="{C8D4145A-32E1-4756-AF8D-DEC4E8549694}" dt="2017-09-28T11:32:40.135" v="4" actId="20577"/>
+        <pc:sldMkLst>
+          <pc:docMk/>
+          <pc:sldMk cId="3397301624" sldId="257"/>
+        </pc:sldMkLst>
+        <pc:spChg chg="mod">
+          <ac:chgData name="Adam Kňaze" userId="40677637-cd6a-4c91-9dcf-629dc9dfff03" providerId="ADAL" clId="{C8D4145A-32E1-4756-AF8D-DEC4E8549694}" dt="2017-09-28T11:32:40.135" v="4" actId="20577"/>
+          <ac:spMkLst>
+            <pc:docMk/>
+            <pc:sldMk cId="3397301624" sldId="257"/>
+            <ac:spMk id="2" creationId="{C9659C53-5DD8-4176-A8DD-A34C406479BC}"/>
+          </ac:spMkLst>
+        </pc:spChg>
+      </pc:sldChg>
+      <pc:sldChg chg="add del">
+        <pc:chgData name="Adam Kňaze" userId="40677637-cd6a-4c91-9dcf-629dc9dfff03" providerId="ADAL" clId="{C8D4145A-32E1-4756-AF8D-DEC4E8549694}" dt="2017-09-28T11:31:29.370" v="1" actId="2696"/>
+        <pc:sldMkLst>
+          <pc:docMk/>
+          <pc:sldMk cId="516052299" sldId="261"/>
+        </pc:sldMkLst>
+      </pc:sldChg>
+    </pc:docChg>
+  </pc:docChgLst>
+</pc:chgInfo>
 </file>
 
 <file path=ppt/slideLayouts/slideLayout1.xml><?xml version="1.0" encoding="utf-8"?>
@@ -841,7 +878,7 @@
           <a:p>
             <a:fld id="{C92221D7-3303-4C44-AED1-56BE804275DE}" type="datetimeFigureOut">
               <a:rPr lang="sk-SK" smtClean="0"/>
-              <a:t>25.9.2017</a:t>
+              <a:t>28.09.2017</a:t>
             </a:fld>
             <a:endParaRPr lang="sk-SK"/>
           </a:p>
@@ -1092,7 +1129,7 @@
           <a:p>
             <a:fld id="{C92221D7-3303-4C44-AED1-56BE804275DE}" type="datetimeFigureOut">
               <a:rPr lang="sk-SK" smtClean="0"/>
-              <a:t>25.9.2017</a:t>
+              <a:t>28.09.2017</a:t>
             </a:fld>
             <a:endParaRPr lang="sk-SK"/>
           </a:p>
@@ -1406,7 +1443,7 @@
           <a:p>
             <a:fld id="{C92221D7-3303-4C44-AED1-56BE804275DE}" type="datetimeFigureOut">
               <a:rPr lang="sk-SK" smtClean="0"/>
-              <a:t>25.9.2017</a:t>
+              <a:t>28.09.2017</a:t>
             </a:fld>
             <a:endParaRPr lang="sk-SK"/>
           </a:p>
@@ -1747,7 +1784,7 @@
           <a:p>
             <a:fld id="{C92221D7-3303-4C44-AED1-56BE804275DE}" type="datetimeFigureOut">
               <a:rPr lang="sk-SK" smtClean="0"/>
-              <a:t>25.9.2017</a:t>
+              <a:t>28.09.2017</a:t>
             </a:fld>
             <a:endParaRPr lang="sk-SK"/>
           </a:p>
@@ -2061,7 +2098,7 @@
           <a:p>
             <a:fld id="{C92221D7-3303-4C44-AED1-56BE804275DE}" type="datetimeFigureOut">
               <a:rPr lang="sk-SK" smtClean="0"/>
-              <a:t>25.9.2017</a:t>
+              <a:t>28.09.2017</a:t>
             </a:fld>
             <a:endParaRPr lang="sk-SK"/>
           </a:p>
@@ -2454,7 +2491,7 @@
           <a:p>
             <a:fld id="{C92221D7-3303-4C44-AED1-56BE804275DE}" type="datetimeFigureOut">
               <a:rPr lang="sk-SK" smtClean="0"/>
-              <a:t>25.9.2017</a:t>
+              <a:t>28.09.2017</a:t>
             </a:fld>
             <a:endParaRPr lang="sk-SK"/>
           </a:p>
@@ -2624,7 +2661,7 @@
           <a:p>
             <a:fld id="{C92221D7-3303-4C44-AED1-56BE804275DE}" type="datetimeFigureOut">
               <a:rPr lang="sk-SK" smtClean="0"/>
-              <a:t>25.9.2017</a:t>
+              <a:t>28.09.2017</a:t>
             </a:fld>
             <a:endParaRPr lang="sk-SK"/>
           </a:p>
@@ -2804,7 +2841,7 @@
           <a:p>
             <a:fld id="{C92221D7-3303-4C44-AED1-56BE804275DE}" type="datetimeFigureOut">
               <a:rPr lang="sk-SK" smtClean="0"/>
-              <a:t>25.9.2017</a:t>
+              <a:t>28.09.2017</a:t>
             </a:fld>
             <a:endParaRPr lang="sk-SK"/>
           </a:p>
@@ -2980,7 +3017,7 @@
           <a:p>
             <a:fld id="{C92221D7-3303-4C44-AED1-56BE804275DE}" type="datetimeFigureOut">
               <a:rPr lang="sk-SK" smtClean="0"/>
-              <a:t>25.9.2017</a:t>
+              <a:t>28.09.2017</a:t>
             </a:fld>
             <a:endParaRPr lang="sk-SK"/>
           </a:p>
@@ -3227,7 +3264,7 @@
           <a:p>
             <a:fld id="{C92221D7-3303-4C44-AED1-56BE804275DE}" type="datetimeFigureOut">
               <a:rPr lang="sk-SK" smtClean="0"/>
-              <a:t>25.9.2017</a:t>
+              <a:t>28.09.2017</a:t>
             </a:fld>
             <a:endParaRPr lang="sk-SK"/>
           </a:p>
@@ -3459,7 +3496,7 @@
           <a:p>
             <a:fld id="{C92221D7-3303-4C44-AED1-56BE804275DE}" type="datetimeFigureOut">
               <a:rPr lang="sk-SK" smtClean="0"/>
-              <a:t>25.9.2017</a:t>
+              <a:t>28.09.2017</a:t>
             </a:fld>
             <a:endParaRPr lang="sk-SK"/>
           </a:p>
@@ -3833,7 +3870,7 @@
           <a:p>
             <a:fld id="{C92221D7-3303-4C44-AED1-56BE804275DE}" type="datetimeFigureOut">
               <a:rPr lang="sk-SK" smtClean="0"/>
-              <a:t>25.9.2017</a:t>
+              <a:t>28.09.2017</a:t>
             </a:fld>
             <a:endParaRPr lang="sk-SK"/>
           </a:p>
@@ -3956,7 +3993,7 @@
           <a:p>
             <a:fld id="{C92221D7-3303-4C44-AED1-56BE804275DE}" type="datetimeFigureOut">
               <a:rPr lang="sk-SK" smtClean="0"/>
-              <a:t>25.9.2017</a:t>
+              <a:t>28.09.2017</a:t>
             </a:fld>
             <a:endParaRPr lang="sk-SK"/>
           </a:p>
@@ -4051,7 +4088,7 @@
           <a:p>
             <a:fld id="{C92221D7-3303-4C44-AED1-56BE804275DE}" type="datetimeFigureOut">
               <a:rPr lang="sk-SK" smtClean="0"/>
-              <a:t>25.9.2017</a:t>
+              <a:t>28.09.2017</a:t>
             </a:fld>
             <a:endParaRPr lang="sk-SK"/>
           </a:p>
@@ -4306,7 +4343,7 @@
           <a:p>
             <a:fld id="{C92221D7-3303-4C44-AED1-56BE804275DE}" type="datetimeFigureOut">
               <a:rPr lang="sk-SK" smtClean="0"/>
-              <a:t>25.9.2017</a:t>
+              <a:t>28.09.2017</a:t>
             </a:fld>
             <a:endParaRPr lang="sk-SK"/>
           </a:p>
@@ -4569,7 +4606,7 @@
           <a:p>
             <a:fld id="{C92221D7-3303-4C44-AED1-56BE804275DE}" type="datetimeFigureOut">
               <a:rPr lang="sk-SK" smtClean="0"/>
-              <a:t>25.9.2017</a:t>
+              <a:t>28.09.2017</a:t>
             </a:fld>
             <a:endParaRPr lang="sk-SK"/>
           </a:p>
@@ -5312,7 +5349,7 @@
           <a:p>
             <a:fld id="{C92221D7-3303-4C44-AED1-56BE804275DE}" type="datetimeFigureOut">
               <a:rPr lang="sk-SK" smtClean="0"/>
-              <a:t>25.9.2017</a:t>
+              <a:t>28.09.2017</a:t>
             </a:fld>
             <a:endParaRPr lang="sk-SK"/>
           </a:p>
@@ -5942,7 +5979,7 @@
           <a:p>
             <a:r>
               <a:rPr lang="sk-SK" dirty="0"/>
-              <a:t>www.urobsisam.zoznam.sk/recepty</a:t>
+              <a:t>www.urobsisamzoznam.sk/recepty</a:t>
             </a:r>
           </a:p>
         </p:txBody>

</xml_diff>